<commit_message>
Issue 174: create gif for auto-captions Update Issue 174
</commit_message>
<xml_diff>
--- a/doc/Notes to audio gif.pptx
+++ b/doc/Notes to audio gif.pptx
@@ -167,6 +167,9 @@
             <a:off x="548640" y="1554480"/>
             <a:ext cx="2560320" cy="701040"/>
           </a:xfrm>
+          <a:prstGeom prst="rect">
+            <a:avLst/>
+          </a:prstGeom>
         </p:spPr>
         <p:txBody>
           <a:bodyPr/>
@@ -281,14 +284,22 @@
             <p:ph type="dt" sz="half" idx="10"/>
           </p:nvPr>
         </p:nvSpPr>
-        <p:spPr/>
+        <p:spPr>
+          <a:xfrm>
+            <a:off x="182880" y="2542540"/>
+            <a:ext cx="853440" cy="146050"/>
+          </a:xfrm>
+          <a:prstGeom prst="rect">
+            <a:avLst/>
+          </a:prstGeom>
+        </p:spPr>
         <p:txBody>
           <a:bodyPr/>
           <a:lstStyle/>
           <a:p>
             <a:fld id="{1C243D36-5217-48BF-A097-7AA0FC8B35E5}" type="datetimeFigureOut">
               <a:rPr lang="en-US" smtClean="0"/>
-              <a:t>12/27/2013</a:t>
+              <a:t>2/2/2014</a:t>
             </a:fld>
             <a:endParaRPr lang="en-US"/>
           </a:p>
@@ -304,7 +315,15 @@
             <p:ph type="ftr" sz="quarter" idx="11"/>
           </p:nvPr>
         </p:nvSpPr>
-        <p:spPr/>
+        <p:spPr>
+          <a:xfrm>
+            <a:off x="1249680" y="2542540"/>
+            <a:ext cx="1158240" cy="146050"/>
+          </a:xfrm>
+          <a:prstGeom prst="rect">
+            <a:avLst/>
+          </a:prstGeom>
+        </p:spPr>
         <p:txBody>
           <a:bodyPr/>
           <a:lstStyle/>
@@ -323,7 +342,15 @@
             <p:ph type="sldNum" sz="quarter" idx="12"/>
           </p:nvPr>
         </p:nvSpPr>
-        <p:spPr/>
+        <p:spPr>
+          <a:xfrm>
+            <a:off x="2621280" y="2542540"/>
+            <a:ext cx="853440" cy="146050"/>
+          </a:xfrm>
+          <a:prstGeom prst="rect">
+            <a:avLst/>
+          </a:prstGeom>
+        </p:spPr>
         <p:txBody>
           <a:bodyPr/>
           <a:lstStyle/>
@@ -399,7 +426,15 @@
             <p:ph type="body" orient="vert" idx="1"/>
           </p:nvPr>
         </p:nvSpPr>
-        <p:spPr/>
+        <p:spPr>
+          <a:xfrm>
+            <a:off x="182880" y="640080"/>
+            <a:ext cx="3291840" cy="1810385"/>
+          </a:xfrm>
+          <a:prstGeom prst="rect">
+            <a:avLst/>
+          </a:prstGeom>
+        </p:spPr>
         <p:txBody>
           <a:bodyPr vert="eaVert"/>
           <a:lstStyle/>
@@ -451,14 +486,22 @@
             <p:ph type="dt" sz="half" idx="10"/>
           </p:nvPr>
         </p:nvSpPr>
-        <p:spPr/>
+        <p:spPr>
+          <a:xfrm>
+            <a:off x="182880" y="2542540"/>
+            <a:ext cx="853440" cy="146050"/>
+          </a:xfrm>
+          <a:prstGeom prst="rect">
+            <a:avLst/>
+          </a:prstGeom>
+        </p:spPr>
         <p:txBody>
           <a:bodyPr/>
           <a:lstStyle/>
           <a:p>
             <a:fld id="{1C243D36-5217-48BF-A097-7AA0FC8B35E5}" type="datetimeFigureOut">
               <a:rPr lang="en-US" smtClean="0"/>
-              <a:t>12/27/2013</a:t>
+              <a:t>2/2/2014</a:t>
             </a:fld>
             <a:endParaRPr lang="en-US"/>
           </a:p>
@@ -474,7 +517,15 @@
             <p:ph type="ftr" sz="quarter" idx="11"/>
           </p:nvPr>
         </p:nvSpPr>
-        <p:spPr/>
+        <p:spPr>
+          <a:xfrm>
+            <a:off x="1249680" y="2542540"/>
+            <a:ext cx="1158240" cy="146050"/>
+          </a:xfrm>
+          <a:prstGeom prst="rect">
+            <a:avLst/>
+          </a:prstGeom>
+        </p:spPr>
         <p:txBody>
           <a:bodyPr/>
           <a:lstStyle/>
@@ -493,7 +544,15 @@
             <p:ph type="sldNum" sz="quarter" idx="12"/>
           </p:nvPr>
         </p:nvSpPr>
-        <p:spPr/>
+        <p:spPr>
+          <a:xfrm>
+            <a:off x="2621280" y="2542540"/>
+            <a:ext cx="853440" cy="146050"/>
+          </a:xfrm>
+          <a:prstGeom prst="rect">
+            <a:avLst/>
+          </a:prstGeom>
+        </p:spPr>
         <p:txBody>
           <a:bodyPr/>
           <a:lstStyle/>
@@ -579,6 +638,9 @@
             <a:off x="73025" y="43815"/>
             <a:ext cx="927100" cy="936625"/>
           </a:xfrm>
+          <a:prstGeom prst="rect">
+            <a:avLst/>
+          </a:prstGeom>
         </p:spPr>
         <p:txBody>
           <a:bodyPr vert="eaVert"/>
@@ -631,14 +693,22 @@
             <p:ph type="dt" sz="half" idx="10"/>
           </p:nvPr>
         </p:nvSpPr>
-        <p:spPr/>
+        <p:spPr>
+          <a:xfrm>
+            <a:off x="182880" y="2542540"/>
+            <a:ext cx="853440" cy="146050"/>
+          </a:xfrm>
+          <a:prstGeom prst="rect">
+            <a:avLst/>
+          </a:prstGeom>
+        </p:spPr>
         <p:txBody>
           <a:bodyPr/>
           <a:lstStyle/>
           <a:p>
             <a:fld id="{1C243D36-5217-48BF-A097-7AA0FC8B35E5}" type="datetimeFigureOut">
               <a:rPr lang="en-US" smtClean="0"/>
-              <a:t>12/27/2013</a:t>
+              <a:t>2/2/2014</a:t>
             </a:fld>
             <a:endParaRPr lang="en-US"/>
           </a:p>
@@ -654,7 +724,15 @@
             <p:ph type="ftr" sz="quarter" idx="11"/>
           </p:nvPr>
         </p:nvSpPr>
-        <p:spPr/>
+        <p:spPr>
+          <a:xfrm>
+            <a:off x="1249680" y="2542540"/>
+            <a:ext cx="1158240" cy="146050"/>
+          </a:xfrm>
+          <a:prstGeom prst="rect">
+            <a:avLst/>
+          </a:prstGeom>
+        </p:spPr>
         <p:txBody>
           <a:bodyPr/>
           <a:lstStyle/>
@@ -673,7 +751,15 @@
             <p:ph type="sldNum" sz="quarter" idx="12"/>
           </p:nvPr>
         </p:nvSpPr>
-        <p:spPr/>
+        <p:spPr>
+          <a:xfrm>
+            <a:off x="2621280" y="2542540"/>
+            <a:ext cx="853440" cy="146050"/>
+          </a:xfrm>
+          <a:prstGeom prst="rect">
+            <a:avLst/>
+          </a:prstGeom>
+        </p:spPr>
         <p:txBody>
           <a:bodyPr/>
           <a:lstStyle/>
@@ -749,7 +835,15 @@
             <p:ph idx="1"/>
           </p:nvPr>
         </p:nvSpPr>
-        <p:spPr/>
+        <p:spPr>
+          <a:xfrm>
+            <a:off x="182880" y="640080"/>
+            <a:ext cx="3291840" cy="1810385"/>
+          </a:xfrm>
+          <a:prstGeom prst="rect">
+            <a:avLst/>
+          </a:prstGeom>
+        </p:spPr>
         <p:txBody>
           <a:bodyPr/>
           <a:lstStyle/>
@@ -801,14 +895,22 @@
             <p:ph type="dt" sz="half" idx="10"/>
           </p:nvPr>
         </p:nvSpPr>
-        <p:spPr/>
+        <p:spPr>
+          <a:xfrm>
+            <a:off x="182880" y="2542540"/>
+            <a:ext cx="853440" cy="146050"/>
+          </a:xfrm>
+          <a:prstGeom prst="rect">
+            <a:avLst/>
+          </a:prstGeom>
+        </p:spPr>
         <p:txBody>
           <a:bodyPr/>
           <a:lstStyle/>
           <a:p>
             <a:fld id="{1C243D36-5217-48BF-A097-7AA0FC8B35E5}" type="datetimeFigureOut">
               <a:rPr lang="en-US" smtClean="0"/>
-              <a:t>12/27/2013</a:t>
+              <a:t>2/2/2014</a:t>
             </a:fld>
             <a:endParaRPr lang="en-US"/>
           </a:p>
@@ -824,7 +926,15 @@
             <p:ph type="ftr" sz="quarter" idx="11"/>
           </p:nvPr>
         </p:nvSpPr>
-        <p:spPr/>
+        <p:spPr>
+          <a:xfrm>
+            <a:off x="1249680" y="2542540"/>
+            <a:ext cx="1158240" cy="146050"/>
+          </a:xfrm>
+          <a:prstGeom prst="rect">
+            <a:avLst/>
+          </a:prstGeom>
+        </p:spPr>
         <p:txBody>
           <a:bodyPr/>
           <a:lstStyle/>
@@ -843,7 +953,15 @@
             <p:ph type="sldNum" sz="quarter" idx="12"/>
           </p:nvPr>
         </p:nvSpPr>
-        <p:spPr/>
+        <p:spPr>
+          <a:xfrm>
+            <a:off x="2621280" y="2542540"/>
+            <a:ext cx="853440" cy="146050"/>
+          </a:xfrm>
+          <a:prstGeom prst="rect">
+            <a:avLst/>
+          </a:prstGeom>
+        </p:spPr>
         <p:txBody>
           <a:bodyPr/>
           <a:lstStyle/>
@@ -940,6 +1058,9 @@
             <a:off x="288925" y="1162685"/>
             <a:ext cx="3108960" cy="600075"/>
           </a:xfrm>
+          <a:prstGeom prst="rect">
+            <a:avLst/>
+          </a:prstGeom>
         </p:spPr>
         <p:txBody>
           <a:bodyPr anchor="b"/>
@@ -1054,14 +1175,22 @@
             <p:ph type="dt" sz="half" idx="10"/>
           </p:nvPr>
         </p:nvSpPr>
-        <p:spPr/>
+        <p:spPr>
+          <a:xfrm>
+            <a:off x="182880" y="2542540"/>
+            <a:ext cx="853440" cy="146050"/>
+          </a:xfrm>
+          <a:prstGeom prst="rect">
+            <a:avLst/>
+          </a:prstGeom>
+        </p:spPr>
         <p:txBody>
           <a:bodyPr/>
           <a:lstStyle/>
           <a:p>
             <a:fld id="{1C243D36-5217-48BF-A097-7AA0FC8B35E5}" type="datetimeFigureOut">
               <a:rPr lang="en-US" smtClean="0"/>
-              <a:t>12/27/2013</a:t>
+              <a:t>2/2/2014</a:t>
             </a:fld>
             <a:endParaRPr lang="en-US"/>
           </a:p>
@@ -1077,7 +1206,15 @@
             <p:ph type="ftr" sz="quarter" idx="11"/>
           </p:nvPr>
         </p:nvSpPr>
-        <p:spPr/>
+        <p:spPr>
+          <a:xfrm>
+            <a:off x="1249680" y="2542540"/>
+            <a:ext cx="1158240" cy="146050"/>
+          </a:xfrm>
+          <a:prstGeom prst="rect">
+            <a:avLst/>
+          </a:prstGeom>
+        </p:spPr>
         <p:txBody>
           <a:bodyPr/>
           <a:lstStyle/>
@@ -1096,7 +1233,15 @@
             <p:ph type="sldNum" sz="quarter" idx="12"/>
           </p:nvPr>
         </p:nvSpPr>
-        <p:spPr/>
+        <p:spPr>
+          <a:xfrm>
+            <a:off x="2621280" y="2542540"/>
+            <a:ext cx="853440" cy="146050"/>
+          </a:xfrm>
+          <a:prstGeom prst="rect">
+            <a:avLst/>
+          </a:prstGeom>
+        </p:spPr>
         <p:txBody>
           <a:bodyPr/>
           <a:lstStyle/>
@@ -1177,6 +1322,9 @@
             <a:off x="73025" y="255905"/>
             <a:ext cx="628015" cy="724535"/>
           </a:xfrm>
+          <a:prstGeom prst="rect">
+            <a:avLst/>
+          </a:prstGeom>
         </p:spPr>
         <p:txBody>
           <a:bodyPr/>
@@ -1262,6 +1410,9 @@
             <a:off x="762000" y="255905"/>
             <a:ext cx="628015" cy="724535"/>
           </a:xfrm>
+          <a:prstGeom prst="rect">
+            <a:avLst/>
+          </a:prstGeom>
         </p:spPr>
         <p:txBody>
           <a:bodyPr/>
@@ -1342,14 +1493,22 @@
             <p:ph type="dt" sz="half" idx="10"/>
           </p:nvPr>
         </p:nvSpPr>
-        <p:spPr/>
+        <p:spPr>
+          <a:xfrm>
+            <a:off x="182880" y="2542540"/>
+            <a:ext cx="853440" cy="146050"/>
+          </a:xfrm>
+          <a:prstGeom prst="rect">
+            <a:avLst/>
+          </a:prstGeom>
+        </p:spPr>
         <p:txBody>
           <a:bodyPr/>
           <a:lstStyle/>
           <a:p>
             <a:fld id="{1C243D36-5217-48BF-A097-7AA0FC8B35E5}" type="datetimeFigureOut">
               <a:rPr lang="en-US" smtClean="0"/>
-              <a:t>12/27/2013</a:t>
+              <a:t>2/2/2014</a:t>
             </a:fld>
             <a:endParaRPr lang="en-US"/>
           </a:p>
@@ -1365,7 +1524,15 @@
             <p:ph type="ftr" sz="quarter" idx="11"/>
           </p:nvPr>
         </p:nvSpPr>
-        <p:spPr/>
+        <p:spPr>
+          <a:xfrm>
+            <a:off x="1249680" y="2542540"/>
+            <a:ext cx="1158240" cy="146050"/>
+          </a:xfrm>
+          <a:prstGeom prst="rect">
+            <a:avLst/>
+          </a:prstGeom>
+        </p:spPr>
         <p:txBody>
           <a:bodyPr/>
           <a:lstStyle/>
@@ -1384,7 +1551,15 @@
             <p:ph type="sldNum" sz="quarter" idx="12"/>
           </p:nvPr>
         </p:nvSpPr>
-        <p:spPr/>
+        <p:spPr>
+          <a:xfrm>
+            <a:off x="2621280" y="2542540"/>
+            <a:ext cx="853440" cy="146050"/>
+          </a:xfrm>
+          <a:prstGeom prst="rect">
+            <a:avLst/>
+          </a:prstGeom>
+        </p:spPr>
         <p:txBody>
           <a:bodyPr/>
           <a:lstStyle/>
@@ -1474,6 +1649,9 @@
             <a:off x="182880" y="614045"/>
             <a:ext cx="1616075" cy="255905"/>
           </a:xfrm>
+          <a:prstGeom prst="rect">
+            <a:avLst/>
+          </a:prstGeom>
         </p:spPr>
         <p:txBody>
           <a:bodyPr anchor="b"/>
@@ -1539,6 +1717,9 @@
             <a:off x="182880" y="869950"/>
             <a:ext cx="1616075" cy="1580515"/>
           </a:xfrm>
+          <a:prstGeom prst="rect">
+            <a:avLst/>
+          </a:prstGeom>
         </p:spPr>
         <p:txBody>
           <a:bodyPr/>
@@ -1624,6 +1805,9 @@
             <a:off x="1858010" y="614045"/>
             <a:ext cx="1616710" cy="255905"/>
           </a:xfrm>
+          <a:prstGeom prst="rect">
+            <a:avLst/>
+          </a:prstGeom>
         </p:spPr>
         <p:txBody>
           <a:bodyPr anchor="b"/>
@@ -1689,6 +1873,9 @@
             <a:off x="1858010" y="869950"/>
             <a:ext cx="1616710" cy="1580515"/>
           </a:xfrm>
+          <a:prstGeom prst="rect">
+            <a:avLst/>
+          </a:prstGeom>
         </p:spPr>
         <p:txBody>
           <a:bodyPr/>
@@ -1769,14 +1956,22 @@
             <p:ph type="dt" sz="half" idx="10"/>
           </p:nvPr>
         </p:nvSpPr>
-        <p:spPr/>
+        <p:spPr>
+          <a:xfrm>
+            <a:off x="182880" y="2542540"/>
+            <a:ext cx="853440" cy="146050"/>
+          </a:xfrm>
+          <a:prstGeom prst="rect">
+            <a:avLst/>
+          </a:prstGeom>
+        </p:spPr>
         <p:txBody>
           <a:bodyPr/>
           <a:lstStyle/>
           <a:p>
             <a:fld id="{1C243D36-5217-48BF-A097-7AA0FC8B35E5}" type="datetimeFigureOut">
               <a:rPr lang="en-US" smtClean="0"/>
-              <a:t>12/27/2013</a:t>
+              <a:t>2/2/2014</a:t>
             </a:fld>
             <a:endParaRPr lang="en-US"/>
           </a:p>
@@ -1792,7 +1987,15 @@
             <p:ph type="ftr" sz="quarter" idx="11"/>
           </p:nvPr>
         </p:nvSpPr>
-        <p:spPr/>
+        <p:spPr>
+          <a:xfrm>
+            <a:off x="1249680" y="2542540"/>
+            <a:ext cx="1158240" cy="146050"/>
+          </a:xfrm>
+          <a:prstGeom prst="rect">
+            <a:avLst/>
+          </a:prstGeom>
+        </p:spPr>
         <p:txBody>
           <a:bodyPr/>
           <a:lstStyle/>
@@ -1811,7 +2014,15 @@
             <p:ph type="sldNum" sz="quarter" idx="12"/>
           </p:nvPr>
         </p:nvSpPr>
-        <p:spPr/>
+        <p:spPr>
+          <a:xfrm>
+            <a:off x="2621280" y="2542540"/>
+            <a:ext cx="853440" cy="146050"/>
+          </a:xfrm>
+          <a:prstGeom prst="rect">
+            <a:avLst/>
+          </a:prstGeom>
+        </p:spPr>
         <p:txBody>
           <a:bodyPr/>
           <a:lstStyle/>
@@ -1887,14 +2098,22 @@
             <p:ph type="dt" sz="half" idx="10"/>
           </p:nvPr>
         </p:nvSpPr>
-        <p:spPr/>
+        <p:spPr>
+          <a:xfrm>
+            <a:off x="182880" y="2542540"/>
+            <a:ext cx="853440" cy="146050"/>
+          </a:xfrm>
+          <a:prstGeom prst="rect">
+            <a:avLst/>
+          </a:prstGeom>
+        </p:spPr>
         <p:txBody>
           <a:bodyPr/>
           <a:lstStyle/>
           <a:p>
             <a:fld id="{1C243D36-5217-48BF-A097-7AA0FC8B35E5}" type="datetimeFigureOut">
               <a:rPr lang="en-US" smtClean="0"/>
-              <a:t>12/27/2013</a:t>
+              <a:t>2/2/2014</a:t>
             </a:fld>
             <a:endParaRPr lang="en-US"/>
           </a:p>
@@ -1910,7 +2129,15 @@
             <p:ph type="ftr" sz="quarter" idx="11"/>
           </p:nvPr>
         </p:nvSpPr>
-        <p:spPr/>
+        <p:spPr>
+          <a:xfrm>
+            <a:off x="1249680" y="2542540"/>
+            <a:ext cx="1158240" cy="146050"/>
+          </a:xfrm>
+          <a:prstGeom prst="rect">
+            <a:avLst/>
+          </a:prstGeom>
+        </p:spPr>
         <p:txBody>
           <a:bodyPr/>
           <a:lstStyle/>
@@ -1929,7 +2156,15 @@
             <p:ph type="sldNum" sz="quarter" idx="12"/>
           </p:nvPr>
         </p:nvSpPr>
-        <p:spPr/>
+        <p:spPr>
+          <a:xfrm>
+            <a:off x="2621280" y="2542540"/>
+            <a:ext cx="853440" cy="146050"/>
+          </a:xfrm>
+          <a:prstGeom prst="rect">
+            <a:avLst/>
+          </a:prstGeom>
+        </p:spPr>
         <p:txBody>
           <a:bodyPr/>
           <a:lstStyle/>
@@ -1982,14 +2217,22 @@
             <p:ph type="dt" sz="half" idx="10"/>
           </p:nvPr>
         </p:nvSpPr>
-        <p:spPr/>
+        <p:spPr>
+          <a:xfrm>
+            <a:off x="182880" y="2542540"/>
+            <a:ext cx="853440" cy="146050"/>
+          </a:xfrm>
+          <a:prstGeom prst="rect">
+            <a:avLst/>
+          </a:prstGeom>
+        </p:spPr>
         <p:txBody>
           <a:bodyPr/>
           <a:lstStyle/>
           <a:p>
             <a:fld id="{1C243D36-5217-48BF-A097-7AA0FC8B35E5}" type="datetimeFigureOut">
               <a:rPr lang="en-US" smtClean="0"/>
-              <a:t>12/27/2013</a:t>
+              <a:t>2/2/2014</a:t>
             </a:fld>
             <a:endParaRPr lang="en-US"/>
           </a:p>
@@ -2005,7 +2248,15 @@
             <p:ph type="ftr" sz="quarter" idx="11"/>
           </p:nvPr>
         </p:nvSpPr>
-        <p:spPr/>
+        <p:spPr>
+          <a:xfrm>
+            <a:off x="1249680" y="2542540"/>
+            <a:ext cx="1158240" cy="146050"/>
+          </a:xfrm>
+          <a:prstGeom prst="rect">
+            <a:avLst/>
+          </a:prstGeom>
+        </p:spPr>
         <p:txBody>
           <a:bodyPr/>
           <a:lstStyle/>
@@ -2024,7 +2275,15 @@
             <p:ph type="sldNum" sz="quarter" idx="12"/>
           </p:nvPr>
         </p:nvSpPr>
-        <p:spPr/>
+        <p:spPr>
+          <a:xfrm>
+            <a:off x="2621280" y="2542540"/>
+            <a:ext cx="853440" cy="146050"/>
+          </a:xfrm>
+          <a:prstGeom prst="rect">
+            <a:avLst/>
+          </a:prstGeom>
+        </p:spPr>
         <p:txBody>
           <a:bodyPr/>
           <a:lstStyle/>
@@ -2114,6 +2373,9 @@
             <a:off x="1430020" y="109220"/>
             <a:ext cx="2044700" cy="2341245"/>
           </a:xfrm>
+          <a:prstGeom prst="rect">
+            <a:avLst/>
+          </a:prstGeom>
         </p:spPr>
         <p:txBody>
           <a:bodyPr/>
@@ -2199,6 +2461,9 @@
             <a:off x="182880" y="574040"/>
             <a:ext cx="1203325" cy="1876425"/>
           </a:xfrm>
+          <a:prstGeom prst="rect">
+            <a:avLst/>
+          </a:prstGeom>
         </p:spPr>
         <p:txBody>
           <a:bodyPr/>
@@ -2259,14 +2524,22 @@
             <p:ph type="dt" sz="half" idx="10"/>
           </p:nvPr>
         </p:nvSpPr>
-        <p:spPr/>
+        <p:spPr>
+          <a:xfrm>
+            <a:off x="182880" y="2542540"/>
+            <a:ext cx="853440" cy="146050"/>
+          </a:xfrm>
+          <a:prstGeom prst="rect">
+            <a:avLst/>
+          </a:prstGeom>
+        </p:spPr>
         <p:txBody>
           <a:bodyPr/>
           <a:lstStyle/>
           <a:p>
             <a:fld id="{1C243D36-5217-48BF-A097-7AA0FC8B35E5}" type="datetimeFigureOut">
               <a:rPr lang="en-US" smtClean="0"/>
-              <a:t>12/27/2013</a:t>
+              <a:t>2/2/2014</a:t>
             </a:fld>
             <a:endParaRPr lang="en-US"/>
           </a:p>
@@ -2282,7 +2555,15 @@
             <p:ph type="ftr" sz="quarter" idx="11"/>
           </p:nvPr>
         </p:nvSpPr>
-        <p:spPr/>
+        <p:spPr>
+          <a:xfrm>
+            <a:off x="1249680" y="2542540"/>
+            <a:ext cx="1158240" cy="146050"/>
+          </a:xfrm>
+          <a:prstGeom prst="rect">
+            <a:avLst/>
+          </a:prstGeom>
+        </p:spPr>
         <p:txBody>
           <a:bodyPr/>
           <a:lstStyle/>
@@ -2301,7 +2582,15 @@
             <p:ph type="sldNum" sz="quarter" idx="12"/>
           </p:nvPr>
         </p:nvSpPr>
-        <p:spPr/>
+        <p:spPr>
+          <a:xfrm>
+            <a:off x="2621280" y="2542540"/>
+            <a:ext cx="853440" cy="146050"/>
+          </a:xfrm>
+          <a:prstGeom prst="rect">
+            <a:avLst/>
+          </a:prstGeom>
+        </p:spPr>
         <p:txBody>
           <a:bodyPr/>
           <a:lstStyle/>
@@ -2391,6 +2680,9 @@
             <a:off x="716915" y="245110"/>
             <a:ext cx="2194560" cy="1645920"/>
           </a:xfrm>
+          <a:prstGeom prst="rect">
+            <a:avLst/>
+          </a:prstGeom>
         </p:spPr>
         <p:txBody>
           <a:bodyPr/>
@@ -2452,6 +2744,9 @@
             <a:off x="716915" y="2146935"/>
             <a:ext cx="2194560" cy="321945"/>
           </a:xfrm>
+          <a:prstGeom prst="rect">
+            <a:avLst/>
+          </a:prstGeom>
         </p:spPr>
         <p:txBody>
           <a:bodyPr/>
@@ -2512,14 +2807,22 @@
             <p:ph type="dt" sz="half" idx="10"/>
           </p:nvPr>
         </p:nvSpPr>
-        <p:spPr/>
+        <p:spPr>
+          <a:xfrm>
+            <a:off x="182880" y="2542540"/>
+            <a:ext cx="853440" cy="146050"/>
+          </a:xfrm>
+          <a:prstGeom prst="rect">
+            <a:avLst/>
+          </a:prstGeom>
+        </p:spPr>
         <p:txBody>
           <a:bodyPr/>
           <a:lstStyle/>
           <a:p>
             <a:fld id="{1C243D36-5217-48BF-A097-7AA0FC8B35E5}" type="datetimeFigureOut">
               <a:rPr lang="en-US" smtClean="0"/>
-              <a:t>12/27/2013</a:t>
+              <a:t>2/2/2014</a:t>
             </a:fld>
             <a:endParaRPr lang="en-US"/>
           </a:p>
@@ -2535,7 +2838,15 @@
             <p:ph type="ftr" sz="quarter" idx="11"/>
           </p:nvPr>
         </p:nvSpPr>
-        <p:spPr/>
+        <p:spPr>
+          <a:xfrm>
+            <a:off x="1249680" y="2542540"/>
+            <a:ext cx="1158240" cy="146050"/>
+          </a:xfrm>
+          <a:prstGeom prst="rect">
+            <a:avLst/>
+          </a:prstGeom>
+        </p:spPr>
         <p:txBody>
           <a:bodyPr/>
           <a:lstStyle/>
@@ -2554,7 +2865,15 @@
             <p:ph type="sldNum" sz="quarter" idx="12"/>
           </p:nvPr>
         </p:nvSpPr>
-        <p:spPr/>
+        <p:spPr>
+          <a:xfrm>
+            <a:off x="2621280" y="2542540"/>
+            <a:ext cx="853440" cy="146050"/>
+          </a:xfrm>
+          <a:prstGeom prst="rect">
+            <a:avLst/>
+          </a:prstGeom>
+        </p:spPr>
         <p:txBody>
           <a:bodyPr/>
           <a:lstStyle/>
@@ -2607,6 +2926,70 @@
       </p:grpSpPr>
       <p:sp>
         <p:nvSpPr>
+          <p:cNvPr id="8" name="Rectangle 7"/>
+          <p:cNvSpPr/>
+          <p:nvPr userDrawn="1"/>
+        </p:nvSpPr>
+        <p:spPr>
+          <a:xfrm>
+            <a:off x="0" y="2209800"/>
+            <a:ext cx="3657600" cy="533400"/>
+          </a:xfrm>
+          <a:prstGeom prst="rect">
+            <a:avLst/>
+          </a:prstGeom>
+          <a:solidFill>
+            <a:schemeClr val="bg1">
+              <a:lumMod val="95000"/>
+            </a:schemeClr>
+          </a:solidFill>
+          <a:ln>
+            <a:noFill/>
+          </a:ln>
+          <a:effectLst/>
+        </p:spPr>
+        <p:style>
+          <a:lnRef idx="2">
+            <a:schemeClr val="accent1">
+              <a:shade val="50000"/>
+            </a:schemeClr>
+          </a:lnRef>
+          <a:fillRef idx="1">
+            <a:schemeClr val="accent1"/>
+          </a:fillRef>
+          <a:effectRef idx="0">
+            <a:schemeClr val="accent1"/>
+          </a:effectRef>
+          <a:fontRef idx="minor">
+            <a:schemeClr val="lt1"/>
+          </a:fontRef>
+        </p:style>
+        <p:txBody>
+          <a:bodyPr rtlCol="0" anchor="ctr"/>
+          <a:lstStyle/>
+          <a:p>
+            <a:r>
+              <a:rPr lang="en-US" sz="2000" dirty="0" smtClean="0">
+                <a:solidFill>
+                  <a:schemeClr val="bg1">
+                    <a:lumMod val="65000"/>
+                  </a:schemeClr>
+                </a:solidFill>
+              </a:rPr>
+              <a:t>Text    in   slide  notes</a:t>
+            </a:r>
+            <a:endParaRPr lang="en-US" sz="2000" dirty="0">
+              <a:solidFill>
+                <a:schemeClr val="bg1">
+                  <a:lumMod val="65000"/>
+                </a:schemeClr>
+              </a:solidFill>
+            </a:endParaRPr>
+          </a:p>
+        </p:txBody>
+      </p:sp>
+      <p:sp>
+        <p:nvSpPr>
           <p:cNvPr id="2" name="Title Placeholder 1"/>
           <p:cNvSpPr>
             <a:spLocks noGrp="1"/>
@@ -2640,195 +3023,14 @@
       </p:sp>
       <p:sp>
         <p:nvSpPr>
-          <p:cNvPr id="3" name="Text Placeholder 2"/>
-          <p:cNvSpPr>
-            <a:spLocks noGrp="1"/>
-          </p:cNvSpPr>
-          <p:nvPr>
-            <p:ph type="body" idx="1"/>
-          </p:nvPr>
-        </p:nvSpPr>
-        <p:spPr>
-          <a:xfrm>
-            <a:off x="182880" y="640080"/>
-            <a:ext cx="3291840" cy="1810385"/>
-          </a:xfrm>
-          <a:prstGeom prst="rect">
-            <a:avLst/>
-          </a:prstGeom>
-        </p:spPr>
-        <p:txBody>
-          <a:bodyPr vert="horz" lIns="36576" tIns="18288" rIns="36576" bIns="18288" rtlCol="0">
-            <a:normAutofit/>
-          </a:bodyPr>
-          <a:lstStyle/>
-          <a:p>
-            <a:pPr lvl="0"/>
-            <a:r>
-              <a:rPr lang="en-US" smtClean="0"/>
-              <a:t>Click to edit Master text styles</a:t>
-            </a:r>
-          </a:p>
-          <a:p>
-            <a:pPr lvl="1"/>
-            <a:r>
-              <a:rPr lang="en-US" smtClean="0"/>
-              <a:t>Second level</a:t>
-            </a:r>
-          </a:p>
-          <a:p>
-            <a:pPr lvl="2"/>
-            <a:r>
-              <a:rPr lang="en-US" smtClean="0"/>
-              <a:t>Third level</a:t>
-            </a:r>
-          </a:p>
-          <a:p>
-            <a:pPr lvl="3"/>
-            <a:r>
-              <a:rPr lang="en-US" smtClean="0"/>
-              <a:t>Fourth level</a:t>
-            </a:r>
-          </a:p>
-          <a:p>
-            <a:pPr lvl="4"/>
-            <a:r>
-              <a:rPr lang="en-US" smtClean="0"/>
-              <a:t>Fifth level</a:t>
-            </a:r>
-            <a:endParaRPr lang="en-US"/>
-          </a:p>
-        </p:txBody>
-      </p:sp>
-      <p:sp>
-        <p:nvSpPr>
-          <p:cNvPr id="4" name="Date Placeholder 3"/>
-          <p:cNvSpPr>
-            <a:spLocks noGrp="1"/>
-          </p:cNvSpPr>
-          <p:nvPr>
-            <p:ph type="dt" sz="half" idx="2"/>
-          </p:nvPr>
-        </p:nvSpPr>
-        <p:spPr>
-          <a:xfrm>
-            <a:off x="182880" y="2542540"/>
-            <a:ext cx="853440" cy="146050"/>
-          </a:xfrm>
-          <a:prstGeom prst="rect">
-            <a:avLst/>
-          </a:prstGeom>
-        </p:spPr>
-        <p:txBody>
-          <a:bodyPr vert="horz" lIns="36576" tIns="18288" rIns="36576" bIns="18288" rtlCol="0" anchor="ctr"/>
-          <a:lstStyle>
-            <a:lvl1pPr algn="l">
-              <a:defRPr sz="500">
-                <a:solidFill>
-                  <a:schemeClr val="tx1">
-                    <a:tint val="75000"/>
-                  </a:schemeClr>
-                </a:solidFill>
-              </a:defRPr>
-            </a:lvl1pPr>
-          </a:lstStyle>
-          <a:p>
-            <a:fld id="{1C243D36-5217-48BF-A097-7AA0FC8B35E5}" type="datetimeFigureOut">
-              <a:rPr lang="en-US" smtClean="0"/>
-              <a:t>12/27/2013</a:t>
-            </a:fld>
-            <a:endParaRPr lang="en-US"/>
-          </a:p>
-        </p:txBody>
-      </p:sp>
-      <p:sp>
-        <p:nvSpPr>
-          <p:cNvPr id="5" name="Footer Placeholder 4"/>
-          <p:cNvSpPr>
-            <a:spLocks noGrp="1"/>
-          </p:cNvSpPr>
-          <p:nvPr>
-            <p:ph type="ftr" sz="quarter" idx="3"/>
-          </p:nvPr>
-        </p:nvSpPr>
-        <p:spPr>
-          <a:xfrm>
-            <a:off x="1249680" y="2542540"/>
-            <a:ext cx="1158240" cy="146050"/>
-          </a:xfrm>
-          <a:prstGeom prst="rect">
-            <a:avLst/>
-          </a:prstGeom>
-        </p:spPr>
-        <p:txBody>
-          <a:bodyPr vert="horz" lIns="36576" tIns="18288" rIns="36576" bIns="18288" rtlCol="0" anchor="ctr"/>
-          <a:lstStyle>
-            <a:lvl1pPr algn="ctr">
-              <a:defRPr sz="500">
-                <a:solidFill>
-                  <a:schemeClr val="tx1">
-                    <a:tint val="75000"/>
-                  </a:schemeClr>
-                </a:solidFill>
-              </a:defRPr>
-            </a:lvl1pPr>
-          </a:lstStyle>
-          <a:p>
-            <a:endParaRPr lang="en-US"/>
-          </a:p>
-        </p:txBody>
-      </p:sp>
-      <p:sp>
-        <p:nvSpPr>
-          <p:cNvPr id="6" name="Slide Number Placeholder 5"/>
-          <p:cNvSpPr>
-            <a:spLocks noGrp="1"/>
-          </p:cNvSpPr>
-          <p:nvPr>
-            <p:ph type="sldNum" sz="quarter" idx="4"/>
-          </p:nvPr>
-        </p:nvSpPr>
-        <p:spPr>
-          <a:xfrm>
-            <a:off x="2621280" y="2542540"/>
-            <a:ext cx="853440" cy="146050"/>
-          </a:xfrm>
-          <a:prstGeom prst="rect">
-            <a:avLst/>
-          </a:prstGeom>
-        </p:spPr>
-        <p:txBody>
-          <a:bodyPr vert="horz" lIns="36576" tIns="18288" rIns="36576" bIns="18288" rtlCol="0" anchor="ctr"/>
-          <a:lstStyle>
-            <a:lvl1pPr algn="r">
-              <a:defRPr sz="500">
-                <a:solidFill>
-                  <a:schemeClr val="tx1">
-                    <a:tint val="75000"/>
-                  </a:schemeClr>
-                </a:solidFill>
-              </a:defRPr>
-            </a:lvl1pPr>
-          </a:lstStyle>
-          <a:p>
-            <a:fld id="{F7AFBA14-AC1C-44FC-9CEF-E46F22A4CB85}" type="slidenum">
-              <a:rPr lang="en-US" smtClean="0"/>
-              <a:t>‹#›</a:t>
-            </a:fld>
-            <a:endParaRPr lang="en-US"/>
-          </a:p>
-        </p:txBody>
-      </p:sp>
-      <p:sp>
-        <p:nvSpPr>
           <p:cNvPr id="7" name="Rectangle 6"/>
           <p:cNvSpPr/>
           <p:nvPr userDrawn="1"/>
         </p:nvSpPr>
         <p:spPr>
           <a:xfrm>
-            <a:off x="-1" y="0"/>
-            <a:ext cx="3648456" cy="2734056"/>
+            <a:off x="3437" y="0"/>
+            <a:ext cx="3648456" cy="2209800"/>
           </a:xfrm>
           <a:prstGeom prst="rect">
             <a:avLst/>
@@ -2841,6 +3043,13 @@
               </a:schemeClr>
             </a:solidFill>
           </a:ln>
+          <a:effectLst>
+            <a:outerShdw blurRad="63500" sx="102000" sy="102000" algn="ctr" rotWithShape="0">
+              <a:prstClr val="black">
+                <a:alpha val="40000"/>
+              </a:prstClr>
+            </a:outerShdw>
+          </a:effectLst>
         </p:spPr>
         <p:style>
           <a:lnRef idx="2">
@@ -3173,72 +3382,6 @@
           <a:chExt cx="0" cy="0"/>
         </a:xfrm>
       </p:grpSpPr>
-      <p:sp>
-        <p:nvSpPr>
-          <p:cNvPr id="3" name="Rectangle 2"/>
-          <p:cNvSpPr/>
-          <p:nvPr/>
-        </p:nvSpPr>
-        <p:spPr>
-          <a:xfrm>
-            <a:off x="0" y="2209800"/>
-            <a:ext cx="3657600" cy="533400"/>
-          </a:xfrm>
-          <a:prstGeom prst="rect">
-            <a:avLst/>
-          </a:prstGeom>
-          <a:solidFill>
-            <a:schemeClr val="bg1"/>
-          </a:solidFill>
-          <a:ln>
-            <a:solidFill>
-              <a:schemeClr val="bg1">
-                <a:lumMod val="75000"/>
-              </a:schemeClr>
-            </a:solidFill>
-          </a:ln>
-          <a:effectLst/>
-        </p:spPr>
-        <p:style>
-          <a:lnRef idx="2">
-            <a:schemeClr val="accent1">
-              <a:shade val="50000"/>
-            </a:schemeClr>
-          </a:lnRef>
-          <a:fillRef idx="1">
-            <a:schemeClr val="accent1"/>
-          </a:fillRef>
-          <a:effectRef idx="0">
-            <a:schemeClr val="accent1"/>
-          </a:effectRef>
-          <a:fontRef idx="minor">
-            <a:schemeClr val="lt1"/>
-          </a:fontRef>
-        </p:style>
-        <p:txBody>
-          <a:bodyPr rtlCol="0" anchor="ctr"/>
-          <a:lstStyle/>
-          <a:p>
-            <a:r>
-              <a:rPr lang="en-US" sz="2000" dirty="0" smtClean="0">
-                <a:solidFill>
-                  <a:schemeClr val="bg1">
-                    <a:lumMod val="65000"/>
-                  </a:schemeClr>
-                </a:solidFill>
-              </a:rPr>
-              <a:t>Text    in   slide  notes</a:t>
-            </a:r>
-            <a:endParaRPr lang="en-US" sz="2000" dirty="0">
-              <a:solidFill>
-                <a:schemeClr val="bg1">
-                  <a:lumMod val="65000"/>
-                </a:schemeClr>
-              </a:solidFill>
-            </a:endParaRPr>
-          </a:p>
-        </p:txBody>
-      </p:sp>
       <p:sp>
         <p:nvSpPr>
           <p:cNvPr id="6" name="Sound"/>

</xml_diff>